<commit_message>
added monthly graphs to ppt
</commit_message>
<xml_diff>
--- a/Master Folder/Lunar Phase Influence On Crime in Austin Texas (3).pptx
+++ b/Master Folder/Lunar Phase Influence On Crime in Austin Texas (3).pptx
@@ -17,12 +17,14 @@
     <p:sldId id="261" r:id="rId11"/>
     <p:sldId id="262" r:id="rId12"/>
     <p:sldId id="274" r:id="rId13"/>
-    <p:sldId id="271" r:id="rId14"/>
-    <p:sldId id="269" r:id="rId15"/>
-    <p:sldId id="272" r:id="rId16"/>
-    <p:sldId id="273" r:id="rId17"/>
-    <p:sldId id="275" r:id="rId18"/>
-    <p:sldId id="276" r:id="rId19"/>
+    <p:sldId id="277" r:id="rId14"/>
+    <p:sldId id="278" r:id="rId15"/>
+    <p:sldId id="271" r:id="rId16"/>
+    <p:sldId id="269" r:id="rId17"/>
+    <p:sldId id="272" r:id="rId18"/>
+    <p:sldId id="273" r:id="rId19"/>
+    <p:sldId id="275" r:id="rId20"/>
+    <p:sldId id="276" r:id="rId21"/>
   </p:sldIdLst>
   <p:sldSz cx="12192000" cy="6858000"/>
   <p:notesSz cx="6858000" cy="9144000"/>
@@ -359,7 +361,7 @@
             <a:fld id="{B61BEF0D-F0BB-DE4B-95CE-6DB70DBA9567}" type="datetimeFigureOut">
               <a:rPr lang="en-US" dirty="0"/>
               <a:pPr/>
-              <a:t>3/12/2021</a:t>
+              <a:t>3/13/2021</a:t>
             </a:fld>
             <a:endParaRPr lang="en-US" dirty="0"/>
           </a:p>
@@ -690,7 +692,7 @@
             <a:fld id="{B61BEF0D-F0BB-DE4B-95CE-6DB70DBA9567}" type="datetimeFigureOut">
               <a:rPr lang="en-US" dirty="0"/>
               <a:pPr/>
-              <a:t>3/12/2021</a:t>
+              <a:t>3/13/2021</a:t>
             </a:fld>
             <a:endParaRPr lang="en-US" dirty="0"/>
           </a:p>
@@ -965,7 +967,7 @@
             <a:fld id="{B61BEF0D-F0BB-DE4B-95CE-6DB70DBA9567}" type="datetimeFigureOut">
               <a:rPr lang="en-US" dirty="0"/>
               <a:pPr/>
-              <a:t>3/12/2021</a:t>
+              <a:t>3/13/2021</a:t>
             </a:fld>
             <a:endParaRPr lang="en-US" dirty="0"/>
           </a:p>
@@ -1530,7 +1532,7 @@
             <a:fld id="{B61BEF0D-F0BB-DE4B-95CE-6DB70DBA9567}" type="datetimeFigureOut">
               <a:rPr lang="en-US" dirty="0"/>
               <a:pPr/>
-              <a:t>3/12/2021</a:t>
+              <a:t>3/13/2021</a:t>
             </a:fld>
             <a:endParaRPr lang="en-US" dirty="0"/>
           </a:p>
@@ -1805,7 +1807,7 @@
             <a:fld id="{B61BEF0D-F0BB-DE4B-95CE-6DB70DBA9567}" type="datetimeFigureOut">
               <a:rPr lang="en-US" dirty="0"/>
               <a:pPr/>
-              <a:t>3/12/2021</a:t>
+              <a:t>3/13/2021</a:t>
             </a:fld>
             <a:endParaRPr lang="en-US" dirty="0"/>
           </a:p>
@@ -2364,7 +2366,7 @@
             <a:fld id="{B61BEF0D-F0BB-DE4B-95CE-6DB70DBA9567}" type="datetimeFigureOut">
               <a:rPr lang="en-US" dirty="0"/>
               <a:pPr/>
-              <a:t>3/12/2021</a:t>
+              <a:t>3/13/2021</a:t>
             </a:fld>
             <a:endParaRPr lang="en-US" dirty="0"/>
           </a:p>
@@ -2688,7 +2690,7 @@
             <a:fld id="{B61BEF0D-F0BB-DE4B-95CE-6DB70DBA9567}" type="datetimeFigureOut">
               <a:rPr lang="en-US" dirty="0"/>
               <a:pPr/>
-              <a:t>3/12/2021</a:t>
+              <a:t>3/13/2021</a:t>
             </a:fld>
             <a:endParaRPr lang="en-US" dirty="0"/>
           </a:p>
@@ -2862,7 +2864,7 @@
             <a:fld id="{B61BEF0D-F0BB-DE4B-95CE-6DB70DBA9567}" type="datetimeFigureOut">
               <a:rPr lang="en-US" dirty="0"/>
               <a:pPr/>
-              <a:t>3/12/2021</a:t>
+              <a:t>3/13/2021</a:t>
             </a:fld>
             <a:endParaRPr lang="en-US" dirty="0"/>
           </a:p>
@@ -3097,7 +3099,7 @@
             <a:fld id="{B61BEF0D-F0BB-DE4B-95CE-6DB70DBA9567}" type="datetimeFigureOut">
               <a:rPr lang="en-US" dirty="0"/>
               <a:pPr/>
-              <a:t>3/12/2021</a:t>
+              <a:t>3/13/2021</a:t>
             </a:fld>
             <a:endParaRPr lang="en-US" dirty="0"/>
           </a:p>
@@ -3294,7 +3296,7 @@
             <a:fld id="{B61BEF0D-F0BB-DE4B-95CE-6DB70DBA9567}" type="datetimeFigureOut">
               <a:rPr lang="en-US" dirty="0"/>
               <a:pPr/>
-              <a:t>3/12/2021</a:t>
+              <a:t>3/13/2021</a:t>
             </a:fld>
             <a:endParaRPr lang="en-US" dirty="0"/>
           </a:p>
@@ -3567,7 +3569,7 @@
             <a:fld id="{B61BEF0D-F0BB-DE4B-95CE-6DB70DBA9567}" type="datetimeFigureOut">
               <a:rPr lang="en-US" dirty="0"/>
               <a:pPr/>
-              <a:t>3/12/2021</a:t>
+              <a:t>3/13/2021</a:t>
             </a:fld>
             <a:endParaRPr lang="en-US" dirty="0"/>
           </a:p>
@@ -3830,7 +3832,7 @@
             <a:fld id="{B61BEF0D-F0BB-DE4B-95CE-6DB70DBA9567}" type="datetimeFigureOut">
               <a:rPr lang="en-US" dirty="0"/>
               <a:pPr/>
-              <a:t>3/12/2021</a:t>
+              <a:t>3/13/2021</a:t>
             </a:fld>
             <a:endParaRPr lang="en-US" dirty="0"/>
           </a:p>
@@ -4201,7 +4203,7 @@
             <a:fld id="{B61BEF0D-F0BB-DE4B-95CE-6DB70DBA9567}" type="datetimeFigureOut">
               <a:rPr lang="en-US" dirty="0"/>
               <a:pPr/>
-              <a:t>3/12/2021</a:t>
+              <a:t>3/13/2021</a:t>
             </a:fld>
             <a:endParaRPr lang="en-US" dirty="0"/>
           </a:p>
@@ -4346,7 +4348,7 @@
             <a:fld id="{B61BEF0D-F0BB-DE4B-95CE-6DB70DBA9567}" type="datetimeFigureOut">
               <a:rPr lang="en-US" dirty="0"/>
               <a:pPr/>
-              <a:t>3/12/2021</a:t>
+              <a:t>3/13/2021</a:t>
             </a:fld>
             <a:endParaRPr lang="en-US" dirty="0"/>
           </a:p>
@@ -4468,7 +4470,7 @@
             <a:fld id="{B61BEF0D-F0BB-DE4B-95CE-6DB70DBA9567}" type="datetimeFigureOut">
               <a:rPr lang="en-US" dirty="0"/>
               <a:pPr/>
-              <a:t>3/12/2021</a:t>
+              <a:t>3/13/2021</a:t>
             </a:fld>
             <a:endParaRPr lang="en-US" dirty="0"/>
           </a:p>
@@ -4750,7 +4752,7 @@
             <a:fld id="{B61BEF0D-F0BB-DE4B-95CE-6DB70DBA9567}" type="datetimeFigureOut">
               <a:rPr lang="en-US" dirty="0"/>
               <a:pPr/>
-              <a:t>3/12/2021</a:t>
+              <a:t>3/13/2021</a:t>
             </a:fld>
             <a:endParaRPr lang="en-US" dirty="0"/>
           </a:p>
@@ -5071,7 +5073,7 @@
             <a:fld id="{B61BEF0D-F0BB-DE4B-95CE-6DB70DBA9567}" type="datetimeFigureOut">
               <a:rPr lang="en-US" dirty="0"/>
               <a:pPr/>
-              <a:t>3/12/2021</a:t>
+              <a:t>3/13/2021</a:t>
             </a:fld>
             <a:endParaRPr lang="en-US" dirty="0"/>
           </a:p>
@@ -5282,7 +5284,7 @@
             <a:fld id="{B61BEF0D-F0BB-DE4B-95CE-6DB70DBA9567}" type="datetimeFigureOut">
               <a:rPr lang="en-US" dirty="0"/>
               <a:pPr/>
-              <a:t>3/12/2021</a:t>
+              <a:t>3/13/2021</a:t>
             </a:fld>
             <a:endParaRPr lang="en-US" dirty="0"/>
           </a:p>
@@ -6490,7 +6492,7 @@
           <p:cNvPr id="2" name="Title 1">
             <a:extLst>
               <a:ext uri="{FF2B5EF4-FFF2-40B4-BE49-F238E27FC236}">
-                <a16:creationId xmlns:a16="http://schemas.microsoft.com/office/drawing/2014/main" id="{95D59949-280F-43AA-8DA0-8BCC418455C6}"/>
+                <a16:creationId xmlns:a16="http://schemas.microsoft.com/office/drawing/2014/main" id="{EF509FF9-F654-44C7-84AB-C2B03949550A}"/>
               </a:ext>
             </a:extLst>
           </p:cNvPr>
@@ -6501,39 +6503,36 @@
             <p:ph type="title"/>
           </p:nvPr>
         </p:nvSpPr>
-        <p:spPr/>
-        <p:txBody>
-          <a:bodyPr>
-            <a:normAutofit/>
-          </a:bodyPr>
-          <a:lstStyle/>
-          <a:p>
-            <a:r>
-              <a:rPr lang="en-US" sz="3200" b="0" i="0" dirty="0">
-                <a:effectLst/>
-                <a:latin typeface="Slack-Lato"/>
-              </a:rPr>
-              <a:t>Comparing high crime holidays and Full moon</a:t>
-            </a:r>
-            <a:endParaRPr lang="en-US" sz="3200" dirty="0"/>
+        <p:spPr>
+          <a:xfrm>
+            <a:off x="638667" y="0"/>
+            <a:ext cx="10131425" cy="1456267"/>
+          </a:xfrm>
+        </p:spPr>
+        <p:txBody>
+          <a:bodyPr/>
+          <a:lstStyle/>
+          <a:p>
+            <a:r>
+              <a:rPr lang="en-US" dirty="0"/>
+              <a:t>Crime reports over the years </a:t>
+            </a:r>
           </a:p>
         </p:txBody>
       </p:sp>
       <p:pic>
         <p:nvPicPr>
-          <p:cNvPr id="5" name="Content Placeholder 4" descr="Graphical user interface, application&#10;&#10;Description automatically generated">
+          <p:cNvPr id="5" name="Picture 4">
             <a:extLst>
               <a:ext uri="{FF2B5EF4-FFF2-40B4-BE49-F238E27FC236}">
-                <a16:creationId xmlns:a16="http://schemas.microsoft.com/office/drawing/2014/main" id="{ADE2B374-553A-9F4F-BA68-20850A121087}"/>
+                <a16:creationId xmlns:a16="http://schemas.microsoft.com/office/drawing/2014/main" id="{47D2A71A-599D-401D-8B29-0C062AED5A82}"/>
               </a:ext>
             </a:extLst>
           </p:cNvPr>
           <p:cNvPicPr>
-            <a:picLocks noGrp="1" noChangeAspect="1"/>
+            <a:picLocks noChangeAspect="1"/>
           </p:cNvPicPr>
-          <p:nvPr>
-            <p:ph idx="1"/>
-          </p:nvPr>
+          <p:nvPr/>
         </p:nvPicPr>
         <p:blipFill>
           <a:blip r:embed="rId2"/>
@@ -6543,20 +6542,110 @@
         </p:blipFill>
         <p:spPr>
           <a:xfrm>
-            <a:off x="685801" y="2065867"/>
-            <a:ext cx="6246828" cy="3657600"/>
-          </a:xfrm>
-          <a:solidFill>
-            <a:schemeClr val="tx1"/>
-          </a:solidFill>
+            <a:off x="5300223" y="1592456"/>
+            <a:ext cx="4551575" cy="2301981"/>
+          </a:xfrm>
+          <a:prstGeom prst="rect">
+            <a:avLst/>
+          </a:prstGeom>
         </p:spPr>
       </p:pic>
-      <p:sp>
-        <p:nvSpPr>
-          <p:cNvPr id="3" name="TextBox 2">
+      <p:pic>
+        <p:nvPicPr>
+          <p:cNvPr id="7" name="Picture 6">
             <a:extLst>
               <a:ext uri="{FF2B5EF4-FFF2-40B4-BE49-F238E27FC236}">
-                <a16:creationId xmlns:a16="http://schemas.microsoft.com/office/drawing/2014/main" id="{0A4E97E8-59BE-684B-B5CB-D73B37E605B7}"/>
+                <a16:creationId xmlns:a16="http://schemas.microsoft.com/office/drawing/2014/main" id="{5AF0E7A4-00D0-4E6E-8FB7-5B332620A891}"/>
+              </a:ext>
+            </a:extLst>
+          </p:cNvPr>
+          <p:cNvPicPr>
+            <a:picLocks noChangeAspect="1"/>
+          </p:cNvPicPr>
+          <p:nvPr/>
+        </p:nvPicPr>
+        <p:blipFill>
+          <a:blip r:embed="rId3"/>
+          <a:stretch>
+            <a:fillRect/>
+          </a:stretch>
+        </p:blipFill>
+        <p:spPr>
+          <a:xfrm>
+            <a:off x="803633" y="3996725"/>
+            <a:ext cx="4277415" cy="2334212"/>
+          </a:xfrm>
+          <a:prstGeom prst="rect">
+            <a:avLst/>
+          </a:prstGeom>
+        </p:spPr>
+      </p:pic>
+      <p:pic>
+        <p:nvPicPr>
+          <p:cNvPr id="9" name="Picture 8">
+            <a:extLst>
+              <a:ext uri="{FF2B5EF4-FFF2-40B4-BE49-F238E27FC236}">
+                <a16:creationId xmlns:a16="http://schemas.microsoft.com/office/drawing/2014/main" id="{D0458E20-722B-4751-AE24-840E29F4EC2A}"/>
+              </a:ext>
+            </a:extLst>
+          </p:cNvPr>
+          <p:cNvPicPr>
+            <a:picLocks noChangeAspect="1"/>
+          </p:cNvPicPr>
+          <p:nvPr/>
+        </p:nvPicPr>
+        <p:blipFill>
+          <a:blip r:embed="rId4"/>
+          <a:stretch>
+            <a:fillRect/>
+          </a:stretch>
+        </p:blipFill>
+        <p:spPr>
+          <a:xfrm>
+            <a:off x="5300223" y="3996725"/>
+            <a:ext cx="4551575" cy="2365933"/>
+          </a:xfrm>
+          <a:prstGeom prst="rect">
+            <a:avLst/>
+          </a:prstGeom>
+        </p:spPr>
+      </p:pic>
+      <p:pic>
+        <p:nvPicPr>
+          <p:cNvPr id="15" name="Picture 14">
+            <a:extLst>
+              <a:ext uri="{FF2B5EF4-FFF2-40B4-BE49-F238E27FC236}">
+                <a16:creationId xmlns:a16="http://schemas.microsoft.com/office/drawing/2014/main" id="{8810F4F5-8AB7-4B4A-8728-5A20B4CE323A}"/>
+              </a:ext>
+            </a:extLst>
+          </p:cNvPr>
+          <p:cNvPicPr>
+            <a:picLocks noChangeAspect="1"/>
+          </p:cNvPicPr>
+          <p:nvPr/>
+        </p:nvPicPr>
+        <p:blipFill>
+          <a:blip r:embed="rId5"/>
+          <a:stretch>
+            <a:fillRect/>
+          </a:stretch>
+        </p:blipFill>
+        <p:spPr>
+          <a:xfrm>
+            <a:off x="803633" y="1069899"/>
+            <a:ext cx="4277415" cy="2824538"/>
+          </a:xfrm>
+          <a:prstGeom prst="rect">
+            <a:avLst/>
+          </a:prstGeom>
+        </p:spPr>
+      </p:pic>
+      <p:sp>
+        <p:nvSpPr>
+          <p:cNvPr id="16" name="TextBox 15">
+            <a:extLst>
+              <a:ext uri="{FF2B5EF4-FFF2-40B4-BE49-F238E27FC236}">
+                <a16:creationId xmlns:a16="http://schemas.microsoft.com/office/drawing/2014/main" id="{4F697F3A-9EE5-4854-B5AD-D1D4B8F25C49}"/>
               </a:ext>
             </a:extLst>
           </p:cNvPr>
@@ -6565,8 +6654,8 @@
         </p:nvSpPr>
         <p:spPr>
           <a:xfrm>
-            <a:off x="7590972" y="2065867"/>
-            <a:ext cx="3352800" cy="3046988"/>
+            <a:off x="10012325" y="1489435"/>
+            <a:ext cx="2179675" cy="2893100"/>
           </a:xfrm>
           <a:prstGeom prst="rect">
             <a:avLst/>
@@ -6584,16 +6673,8 @@
               <a:buChar char="•"/>
             </a:pPr>
             <a:r>
-              <a:rPr lang="en-US" sz="2400" dirty="0"/>
-              <a:t>When comparting New Years (1</a:t>
-            </a:r>
-            <a:r>
-              <a:rPr lang="en-US" sz="2400" baseline="30000" dirty="0"/>
-              <a:t>st</a:t>
-            </a:r>
-            <a:r>
-              <a:rPr lang="en-US" sz="2400" dirty="0"/>
-              <a:t> of January) the crimes reported were above 400</a:t>
+              <a:rPr lang="en-US" sz="1400" dirty="0"/>
+              <a:t>Plotted daily crime rates over time by the entire study years as well as by single year</a:t>
             </a:r>
           </a:p>
           <a:p>
@@ -6602,8 +6683,18 @@
               <a:buChar char="•"/>
             </a:pPr>
             <a:r>
-              <a:rPr lang="en-US" sz="2400" dirty="0"/>
-              <a:t>The days the full moon was out the crime rate reports varied randomly</a:t>
+              <a:rPr lang="en-US" sz="1400" dirty="0"/>
+              <a:t>The data is very noisy and difficult to interpret on a line graph</a:t>
+            </a:r>
+          </a:p>
+          <a:p>
+            <a:pPr marL="285750" indent="-285750">
+              <a:buFont typeface="Arial" panose="020B0604020202020204" pitchFamily="34" charset="0"/>
+              <a:buChar char="•"/>
+            </a:pPr>
+            <a:r>
+              <a:rPr lang="en-US" sz="1400" dirty="0"/>
+              <a:t>Determined more robust summary statistics were necessary to interpret the data </a:t>
             </a:r>
           </a:p>
         </p:txBody>
@@ -6611,7 +6702,7 @@
     </p:spTree>
     <p:extLst>
       <p:ext uri="{BB962C8B-B14F-4D97-AF65-F5344CB8AC3E}">
-        <p14:creationId xmlns:p14="http://schemas.microsoft.com/office/powerpoint/2010/main" val="373404331"/>
+        <p14:creationId xmlns:p14="http://schemas.microsoft.com/office/powerpoint/2010/main" val="4130379536"/>
       </p:ext>
     </p:extLst>
   </p:cSld>
@@ -6643,7 +6734,7 @@
           <p:cNvPr id="2" name="Title 1">
             <a:extLst>
               <a:ext uri="{FF2B5EF4-FFF2-40B4-BE49-F238E27FC236}">
-                <a16:creationId xmlns:a16="http://schemas.microsoft.com/office/drawing/2014/main" id="{95D59949-280F-43AA-8DA0-8BCC418455C6}"/>
+                <a16:creationId xmlns:a16="http://schemas.microsoft.com/office/drawing/2014/main" id="{A74293AF-539E-442D-8EF6-DD7D8D26CC39}"/>
               </a:ext>
             </a:extLst>
           </p:cNvPr>
@@ -6654,39 +6745,36 @@
             <p:ph type="title"/>
           </p:nvPr>
         </p:nvSpPr>
-        <p:spPr/>
-        <p:txBody>
-          <a:bodyPr>
-            <a:normAutofit/>
-          </a:bodyPr>
-          <a:lstStyle/>
-          <a:p>
-            <a:r>
-              <a:rPr lang="en-US" sz="3200" b="0" i="0" dirty="0">
-                <a:effectLst/>
-                <a:latin typeface="Slack-Lato"/>
-              </a:rPr>
-              <a:t>Comparing high crime holidays and full moon</a:t>
-            </a:r>
-            <a:endParaRPr lang="en-US" sz="3200" dirty="0"/>
+        <p:spPr>
+          <a:xfrm>
+            <a:off x="742362" y="76985"/>
+            <a:ext cx="10131425" cy="1456267"/>
+          </a:xfrm>
+        </p:spPr>
+        <p:txBody>
+          <a:bodyPr/>
+          <a:lstStyle/>
+          <a:p>
+            <a:r>
+              <a:rPr lang="en-US" dirty="0"/>
+              <a:t>Crime Reports Over the Year Cont.</a:t>
+            </a:r>
           </a:p>
         </p:txBody>
       </p:sp>
       <p:pic>
         <p:nvPicPr>
-          <p:cNvPr id="9" name="Content Placeholder 8" descr="Graphical user interface, application&#10;&#10;Description automatically generated with medium confidence">
+          <p:cNvPr id="4" name="Picture 3">
             <a:extLst>
               <a:ext uri="{FF2B5EF4-FFF2-40B4-BE49-F238E27FC236}">
-                <a16:creationId xmlns:a16="http://schemas.microsoft.com/office/drawing/2014/main" id="{E6B4DD0D-C8DB-F348-8AF5-E6D9AC7445B1}"/>
+                <a16:creationId xmlns:a16="http://schemas.microsoft.com/office/drawing/2014/main" id="{2A2FC3E4-2CA5-46C6-A076-52FFA0FAB81F}"/>
               </a:ext>
             </a:extLst>
           </p:cNvPr>
           <p:cNvPicPr>
-            <a:picLocks noGrp="1" noChangeAspect="1"/>
+            <a:picLocks noChangeAspect="1"/>
           </p:cNvPicPr>
-          <p:nvPr>
-            <p:ph idx="1"/>
-          </p:nvPr>
+          <p:nvPr/>
         </p:nvPicPr>
         <p:blipFill>
           <a:blip r:embed="rId2"/>
@@ -6696,93 +6784,108 @@
         </p:blipFill>
         <p:spPr>
           <a:xfrm>
-            <a:off x="685801" y="2065867"/>
-            <a:ext cx="5882101" cy="3649662"/>
-          </a:xfrm>
-          <a:solidFill>
-            <a:schemeClr val="tx1"/>
-          </a:solidFill>
+            <a:off x="789493" y="1349156"/>
+            <a:ext cx="4277415" cy="2231825"/>
+          </a:xfrm>
+          <a:prstGeom prst="rect">
+            <a:avLst/>
+          </a:prstGeom>
         </p:spPr>
       </p:pic>
-      <p:sp>
-        <p:nvSpPr>
-          <p:cNvPr id="10" name="TextBox 9">
+      <p:pic>
+        <p:nvPicPr>
+          <p:cNvPr id="5" name="Picture 4">
             <a:extLst>
               <a:ext uri="{FF2B5EF4-FFF2-40B4-BE49-F238E27FC236}">
-                <a16:creationId xmlns:a16="http://schemas.microsoft.com/office/drawing/2014/main" id="{6137D893-DDB5-FB47-8F58-ED821C456F0C}"/>
+                <a16:creationId xmlns:a16="http://schemas.microsoft.com/office/drawing/2014/main" id="{A4581CA4-7483-453C-B9ED-4AF338387CED}"/>
               </a:ext>
             </a:extLst>
           </p:cNvPr>
-          <p:cNvSpPr txBox="1"/>
+          <p:cNvPicPr>
+            <a:picLocks noChangeAspect="1"/>
+          </p:cNvPicPr>
           <p:nvPr/>
-        </p:nvSpPr>
-        <p:spPr>
-          <a:xfrm>
-            <a:off x="7344229" y="2065867"/>
-            <a:ext cx="3352800" cy="3785652"/>
+        </p:nvPicPr>
+        <p:blipFill>
+          <a:blip r:embed="rId3"/>
+          <a:stretch>
+            <a:fillRect/>
+          </a:stretch>
+        </p:blipFill>
+        <p:spPr>
+          <a:xfrm>
+            <a:off x="5271939" y="1349156"/>
+            <a:ext cx="4192573" cy="2240807"/>
           </a:xfrm>
           <a:prstGeom prst="rect">
             <a:avLst/>
           </a:prstGeom>
-          <a:noFill/>
-        </p:spPr>
-        <p:txBody>
-          <a:bodyPr wrap="square" rtlCol="0">
-            <a:spAutoFit/>
-          </a:bodyPr>
-          <a:lstStyle/>
-          <a:p>
-            <a:pPr marL="285750" indent="-285750">
-              <a:buFont typeface="Arial" panose="020B0604020202020204" pitchFamily="34" charset="0"/>
-              <a:buChar char="•"/>
-            </a:pPr>
-            <a:r>
-              <a:rPr lang="en-US" sz="2400" dirty="0"/>
-              <a:t>There was no crime correlation for 4</a:t>
-            </a:r>
-            <a:r>
-              <a:rPr lang="en-US" sz="2400" baseline="30000" dirty="0"/>
-              <a:t>th</a:t>
-            </a:r>
-            <a:r>
-              <a:rPr lang="en-US" sz="2400" dirty="0"/>
-              <a:t> of July (American independence day)</a:t>
-            </a:r>
-          </a:p>
-          <a:p>
-            <a:pPr marL="285750" indent="-285750">
-              <a:buFont typeface="Arial" panose="020B0604020202020204" pitchFamily="34" charset="0"/>
-              <a:buChar char="•"/>
-            </a:pPr>
-            <a:r>
-              <a:rPr lang="en-US" sz="2400" dirty="0"/>
-              <a:t>Crime reports were higher on the 1</a:t>
-            </a:r>
-            <a:r>
-              <a:rPr lang="en-US" sz="2400" baseline="30000" dirty="0"/>
-              <a:t>st</a:t>
-            </a:r>
-            <a:r>
-              <a:rPr lang="en-US" sz="2400" dirty="0"/>
-              <a:t> of the month</a:t>
-            </a:r>
-          </a:p>
-          <a:p>
-            <a:pPr marL="285750" indent="-285750">
-              <a:buFont typeface="Arial" panose="020B0604020202020204" pitchFamily="34" charset="0"/>
-              <a:buChar char="•"/>
-            </a:pPr>
-            <a:r>
-              <a:rPr lang="en-US" sz="2400" dirty="0"/>
-              <a:t>The reported crimes varied on the days of full moon </a:t>
-            </a:r>
-          </a:p>
-        </p:txBody>
-      </p:sp>
+        </p:spPr>
+      </p:pic>
+      <p:pic>
+        <p:nvPicPr>
+          <p:cNvPr id="7" name="Picture 6">
+            <a:extLst>
+              <a:ext uri="{FF2B5EF4-FFF2-40B4-BE49-F238E27FC236}">
+                <a16:creationId xmlns:a16="http://schemas.microsoft.com/office/drawing/2014/main" id="{5FA9B77E-399D-4F66-8D2A-B5CD1F3028C0}"/>
+              </a:ext>
+            </a:extLst>
+          </p:cNvPr>
+          <p:cNvPicPr>
+            <a:picLocks noChangeAspect="1"/>
+          </p:cNvPicPr>
+          <p:nvPr/>
+        </p:nvPicPr>
+        <p:blipFill>
+          <a:blip r:embed="rId4"/>
+          <a:stretch>
+            <a:fillRect/>
+          </a:stretch>
+        </p:blipFill>
+        <p:spPr>
+          <a:xfrm>
+            <a:off x="789493" y="3770161"/>
+            <a:ext cx="4277415" cy="2248578"/>
+          </a:xfrm>
+          <a:prstGeom prst="rect">
+            <a:avLst/>
+          </a:prstGeom>
+        </p:spPr>
+      </p:pic>
+      <p:pic>
+        <p:nvPicPr>
+          <p:cNvPr id="9" name="Picture 8">
+            <a:extLst>
+              <a:ext uri="{FF2B5EF4-FFF2-40B4-BE49-F238E27FC236}">
+                <a16:creationId xmlns:a16="http://schemas.microsoft.com/office/drawing/2014/main" id="{20FA38FF-3A8B-4FCA-920B-5408E7AA608A}"/>
+              </a:ext>
+            </a:extLst>
+          </p:cNvPr>
+          <p:cNvPicPr>
+            <a:picLocks noChangeAspect="1"/>
+          </p:cNvPicPr>
+          <p:nvPr/>
+        </p:nvPicPr>
+        <p:blipFill>
+          <a:blip r:embed="rId5"/>
+          <a:stretch>
+            <a:fillRect/>
+          </a:stretch>
+        </p:blipFill>
+        <p:spPr>
+          <a:xfrm>
+            <a:off x="5271939" y="3745299"/>
+            <a:ext cx="4192573" cy="2250252"/>
+          </a:xfrm>
+          <a:prstGeom prst="rect">
+            <a:avLst/>
+          </a:prstGeom>
+        </p:spPr>
+      </p:pic>
     </p:spTree>
     <p:extLst>
       <p:ext uri="{BB962C8B-B14F-4D97-AF65-F5344CB8AC3E}">
-        <p14:creationId xmlns:p14="http://schemas.microsoft.com/office/powerpoint/2010/main" val="3955146142"/>
+        <p14:creationId xmlns:p14="http://schemas.microsoft.com/office/powerpoint/2010/main" val="2380003720"/>
       </p:ext>
     </p:extLst>
   </p:cSld>
@@ -6837,7 +6940,7 @@
                 <a:effectLst/>
                 <a:latin typeface="Slack-Lato"/>
               </a:rPr>
-              <a:t>Comparing high crime holidays and full moon</a:t>
+              <a:t>Comparing high crime holidays and Full moon</a:t>
             </a:r>
             <a:endParaRPr lang="en-US" sz="3200" dirty="0"/>
           </a:p>
@@ -6845,10 +6948,10 @@
       </p:sp>
       <p:pic>
         <p:nvPicPr>
-          <p:cNvPr id="6" name="Content Placeholder 5" descr="A picture containing shape&#10;&#10;Description automatically generated">
+          <p:cNvPr id="5" name="Content Placeholder 4" descr="Graphical user interface, application&#10;&#10;Description automatically generated">
             <a:extLst>
               <a:ext uri="{FF2B5EF4-FFF2-40B4-BE49-F238E27FC236}">
-                <a16:creationId xmlns:a16="http://schemas.microsoft.com/office/drawing/2014/main" id="{3D742373-C084-814A-AE05-1CFA75FA8967}"/>
+                <a16:creationId xmlns:a16="http://schemas.microsoft.com/office/drawing/2014/main" id="{ADE2B374-553A-9F4F-BA68-20850A121087}"/>
               </a:ext>
             </a:extLst>
           </p:cNvPr>
@@ -6867,8 +6970,8 @@
         </p:blipFill>
         <p:spPr>
           <a:xfrm>
-            <a:off x="685801" y="1909309"/>
-            <a:ext cx="6270896" cy="3649662"/>
+            <a:off x="685801" y="2065867"/>
+            <a:ext cx="6246828" cy="3657600"/>
           </a:xfrm>
           <a:solidFill>
             <a:schemeClr val="tx1"/>
@@ -6877,10 +6980,10 @@
       </p:pic>
       <p:sp>
         <p:nvSpPr>
-          <p:cNvPr id="8" name="TextBox 7">
+          <p:cNvPr id="3" name="TextBox 2">
             <a:extLst>
               <a:ext uri="{FF2B5EF4-FFF2-40B4-BE49-F238E27FC236}">
-                <a16:creationId xmlns:a16="http://schemas.microsoft.com/office/drawing/2014/main" id="{01DE470B-ABC4-4740-93FE-B274579067C0}"/>
+                <a16:creationId xmlns:a16="http://schemas.microsoft.com/office/drawing/2014/main" id="{0A4E97E8-59BE-684B-B5CB-D73B37E605B7}"/>
               </a:ext>
             </a:extLst>
           </p:cNvPr>
@@ -6889,8 +6992,8 @@
         </p:nvSpPr>
         <p:spPr>
           <a:xfrm>
-            <a:off x="7718290" y="1914147"/>
-            <a:ext cx="3352800" cy="4154984"/>
+            <a:off x="7590972" y="2065867"/>
+            <a:ext cx="3352800" cy="3046988"/>
           </a:xfrm>
           <a:prstGeom prst="rect">
             <a:avLst/>
@@ -6909,7 +7012,7 @@
             </a:pPr>
             <a:r>
               <a:rPr lang="en-US" sz="2400" dirty="0"/>
-              <a:t>When compared to Halloween (October 31</a:t>
+              <a:t>When comparting New Years (1</a:t>
             </a:r>
             <a:r>
               <a:rPr lang="en-US" sz="2400" baseline="30000" dirty="0"/>
@@ -6917,7 +7020,7 @@
             </a:r>
             <a:r>
               <a:rPr lang="en-US" sz="2400" dirty="0"/>
-              <a:t>) there was a high crime trend for the years 2015 and 2016 but not 2017</a:t>
+              <a:t> of January) the crimes reported were above 400</a:t>
             </a:r>
           </a:p>
           <a:p>
@@ -6927,17 +7030,7 @@
             </a:pPr>
             <a:r>
               <a:rPr lang="en-US" sz="2400" dirty="0"/>
-              <a:t>Crimes reported  were high on the first of the month</a:t>
-            </a:r>
-          </a:p>
-          <a:p>
-            <a:pPr marL="285750" indent="-285750">
-              <a:buFont typeface="Arial" panose="020B0604020202020204" pitchFamily="34" charset="0"/>
-              <a:buChar char="•"/>
-            </a:pPr>
-            <a:r>
-              <a:rPr lang="en-US" sz="2400" dirty="0"/>
-              <a:t>The days the full moon showed no trend</a:t>
+              <a:t>The days the full moon was out the crime rate reports varied randomly</a:t>
             </a:r>
           </a:p>
         </p:txBody>
@@ -6945,7 +7038,7 @@
     </p:spTree>
     <p:extLst>
       <p:ext uri="{BB962C8B-B14F-4D97-AF65-F5344CB8AC3E}">
-        <p14:creationId xmlns:p14="http://schemas.microsoft.com/office/powerpoint/2010/main" val="155600189"/>
+        <p14:creationId xmlns:p14="http://schemas.microsoft.com/office/powerpoint/2010/main" val="373404331"/>
       </p:ext>
     </p:extLst>
   </p:cSld>
@@ -7008,10 +7101,10 @@
       </p:sp>
       <p:pic>
         <p:nvPicPr>
-          <p:cNvPr id="6" name="Content Placeholder 5" descr="Graphical user interface, application&#10;&#10;Description automatically generated">
+          <p:cNvPr id="9" name="Content Placeholder 8" descr="Graphical user interface, application&#10;&#10;Description automatically generated with medium confidence">
             <a:extLst>
               <a:ext uri="{FF2B5EF4-FFF2-40B4-BE49-F238E27FC236}">
-                <a16:creationId xmlns:a16="http://schemas.microsoft.com/office/drawing/2014/main" id="{AABB4EA8-5387-BD4B-A182-4E2E68A3E1C5}"/>
+                <a16:creationId xmlns:a16="http://schemas.microsoft.com/office/drawing/2014/main" id="{E6B4DD0D-C8DB-F348-8AF5-E6D9AC7445B1}"/>
               </a:ext>
             </a:extLst>
           </p:cNvPr>
@@ -7031,7 +7124,7 @@
         <p:spPr>
           <a:xfrm>
             <a:off x="685801" y="2065867"/>
-            <a:ext cx="6484107" cy="3649662"/>
+            <a:ext cx="5882101" cy="3649662"/>
           </a:xfrm>
           <a:solidFill>
             <a:schemeClr val="tx1"/>
@@ -7040,10 +7133,10 @@
       </p:pic>
       <p:sp>
         <p:nvSpPr>
-          <p:cNvPr id="8" name="TextBox 7">
+          <p:cNvPr id="10" name="TextBox 9">
             <a:extLst>
               <a:ext uri="{FF2B5EF4-FFF2-40B4-BE49-F238E27FC236}">
-                <a16:creationId xmlns:a16="http://schemas.microsoft.com/office/drawing/2014/main" id="{45272294-9412-DD43-B5DE-54CB66A9AE03}"/>
+                <a16:creationId xmlns:a16="http://schemas.microsoft.com/office/drawing/2014/main" id="{6137D893-DDB5-FB47-8F58-ED821C456F0C}"/>
               </a:ext>
             </a:extLst>
           </p:cNvPr>
@@ -7052,7 +7145,7 @@
         </p:nvSpPr>
         <p:spPr>
           <a:xfrm>
-            <a:off x="7590972" y="2065867"/>
+            <a:off x="7344229" y="2065867"/>
             <a:ext cx="3352800" cy="3785652"/>
           </a:xfrm>
           <a:prstGeom prst="rect">
@@ -7072,7 +7165,7 @@
             </a:pPr>
             <a:r>
               <a:rPr lang="en-US" sz="2400" dirty="0"/>
-              <a:t>Crime reports decreased around Christmas (25</a:t>
+              <a:t>There was no crime correlation for 4</a:t>
             </a:r>
             <a:r>
               <a:rPr lang="en-US" sz="2400" baseline="30000" dirty="0"/>
@@ -7080,7 +7173,7 @@
             </a:r>
             <a:r>
               <a:rPr lang="en-US" sz="2400" dirty="0"/>
-              <a:t> December)</a:t>
+              <a:t> of July (American independence day)</a:t>
             </a:r>
           </a:p>
           <a:p>
@@ -7090,7 +7183,7 @@
             </a:pPr>
             <a:r>
               <a:rPr lang="en-US" sz="2400" dirty="0"/>
-              <a:t>Crime reporting rates were higher on the 1</a:t>
+              <a:t>Crime reports were higher on the 1</a:t>
             </a:r>
             <a:r>
               <a:rPr lang="en-US" sz="2400" baseline="30000" dirty="0"/>
@@ -7108,7 +7201,7 @@
             </a:pPr>
             <a:r>
               <a:rPr lang="en-US" sz="2400" dirty="0"/>
-              <a:t>There was no relation between the full moon and crimes reported </a:t>
+              <a:t>The reported crimes varied on the days of full moon </a:t>
             </a:r>
           </a:p>
         </p:txBody>
@@ -7116,7 +7209,7 @@
     </p:spTree>
     <p:extLst>
       <p:ext uri="{BB962C8B-B14F-4D97-AF65-F5344CB8AC3E}">
-        <p14:creationId xmlns:p14="http://schemas.microsoft.com/office/powerpoint/2010/main" val="3232841496"/>
+        <p14:creationId xmlns:p14="http://schemas.microsoft.com/office/powerpoint/2010/main" val="3955146142"/>
       </p:ext>
     </p:extLst>
   </p:cSld>
@@ -7177,43 +7270,73 @@
           </a:p>
         </p:txBody>
       </p:sp>
-      <p:sp>
-        <p:nvSpPr>
-          <p:cNvPr id="4" name="Content Placeholder 3">
+      <p:pic>
+        <p:nvPicPr>
+          <p:cNvPr id="6" name="Content Placeholder 5" descr="A picture containing shape&#10;&#10;Description automatically generated">
             <a:extLst>
               <a:ext uri="{FF2B5EF4-FFF2-40B4-BE49-F238E27FC236}">
-                <a16:creationId xmlns:a16="http://schemas.microsoft.com/office/drawing/2014/main" id="{237D400C-391F-1040-B25C-80BDF5942ED4}"/>
+                <a16:creationId xmlns:a16="http://schemas.microsoft.com/office/drawing/2014/main" id="{3D742373-C084-814A-AE05-1CFA75FA8967}"/>
               </a:ext>
             </a:extLst>
           </p:cNvPr>
-          <p:cNvSpPr>
-            <a:spLocks noGrp="1"/>
-          </p:cNvSpPr>
+          <p:cNvPicPr>
+            <a:picLocks noGrp="1" noChangeAspect="1"/>
+          </p:cNvPicPr>
           <p:nvPr>
             <p:ph idx="1"/>
           </p:nvPr>
-        </p:nvSpPr>
-        <p:spPr>
-          <a:xfrm>
-            <a:off x="685801" y="2142067"/>
-            <a:ext cx="10432142" cy="3649133"/>
-          </a:xfrm>
-        </p:spPr>
-        <p:txBody>
-          <a:bodyPr>
-            <a:normAutofit/>
+        </p:nvPicPr>
+        <p:blipFill>
+          <a:blip r:embed="rId2"/>
+          <a:stretch>
+            <a:fillRect/>
+          </a:stretch>
+        </p:blipFill>
+        <p:spPr>
+          <a:xfrm>
+            <a:off x="685801" y="1909309"/>
+            <a:ext cx="6270896" cy="3649662"/>
+          </a:xfrm>
+          <a:solidFill>
+            <a:schemeClr val="tx1"/>
+          </a:solidFill>
+        </p:spPr>
+      </p:pic>
+      <p:sp>
+        <p:nvSpPr>
+          <p:cNvPr id="8" name="TextBox 7">
+            <a:extLst>
+              <a:ext uri="{FF2B5EF4-FFF2-40B4-BE49-F238E27FC236}">
+                <a16:creationId xmlns:a16="http://schemas.microsoft.com/office/drawing/2014/main" id="{01DE470B-ABC4-4740-93FE-B274579067C0}"/>
+              </a:ext>
+            </a:extLst>
+          </p:cNvPr>
+          <p:cNvSpPr txBox="1"/>
+          <p:nvPr/>
+        </p:nvSpPr>
+        <p:spPr>
+          <a:xfrm>
+            <a:off x="7718290" y="1914147"/>
+            <a:ext cx="3352800" cy="4154984"/>
+          </a:xfrm>
+          <a:prstGeom prst="rect">
+            <a:avLst/>
+          </a:prstGeom>
+          <a:noFill/>
+        </p:spPr>
+        <p:txBody>
+          <a:bodyPr wrap="square" rtlCol="0">
+            <a:spAutoFit/>
           </a:bodyPr>
           <a:lstStyle/>
           <a:p>
-            <a:r>
-              <a:rPr lang="en-US" sz="2400" b="1" dirty="0"/>
-              <a:t>There was no correlation between the full moon and crime reported</a:t>
-            </a:r>
-          </a:p>
-          <a:p>
+            <a:pPr marL="285750" indent="-285750">
+              <a:buFont typeface="Arial" panose="020B0604020202020204" pitchFamily="34" charset="0"/>
+              <a:buChar char="•"/>
+            </a:pPr>
             <a:r>
               <a:rPr lang="en-US" sz="2400" dirty="0"/>
-              <a:t>Crimes reported were highest for 1</a:t>
+              <a:t>When compared to Halloween (October 31</a:t>
             </a:r>
             <a:r>
               <a:rPr lang="en-US" sz="2400" baseline="30000" dirty="0"/>
@@ -7221,27 +7344,27 @@
             </a:r>
             <a:r>
               <a:rPr lang="en-US" sz="2400" dirty="0"/>
-              <a:t> of January for all years chosen</a:t>
-            </a:r>
-          </a:p>
-          <a:p>
+              <a:t>) there was a high crime trend for the years 2015 and 2016 but not 2017</a:t>
+            </a:r>
+          </a:p>
+          <a:p>
+            <a:pPr marL="285750" indent="-285750">
+              <a:buFont typeface="Arial" panose="020B0604020202020204" pitchFamily="34" charset="0"/>
+              <a:buChar char="•"/>
+            </a:pPr>
             <a:r>
               <a:rPr lang="en-US" sz="2400" dirty="0"/>
-              <a:t>There was an overall increase in the crime reports on the 1</a:t>
-            </a:r>
-            <a:r>
-              <a:rPr lang="en-US" sz="2400" baseline="30000" dirty="0"/>
-              <a:t>st</a:t>
-            </a:r>
+              <a:t>Crimes reported  were high on the first of the month</a:t>
+            </a:r>
+          </a:p>
+          <a:p>
+            <a:pPr marL="285750" indent="-285750">
+              <a:buFont typeface="Arial" panose="020B0604020202020204" pitchFamily="34" charset="0"/>
+              <a:buChar char="•"/>
+            </a:pPr>
             <a:r>
               <a:rPr lang="en-US" sz="2400" dirty="0"/>
-              <a:t> of the months chosen</a:t>
-            </a:r>
-          </a:p>
-          <a:p>
-            <a:r>
-              <a:rPr lang="en-US" sz="2400" dirty="0"/>
-              <a:t>Crime reports decreased during Christmas time</a:t>
+              <a:t>The days the full moon showed no trend</a:t>
             </a:r>
           </a:p>
         </p:txBody>
@@ -7249,7 +7372,7 @@
     </p:spTree>
     <p:extLst>
       <p:ext uri="{BB962C8B-B14F-4D97-AF65-F5344CB8AC3E}">
-        <p14:creationId xmlns:p14="http://schemas.microsoft.com/office/powerpoint/2010/main" val="2492173261"/>
+        <p14:creationId xmlns:p14="http://schemas.microsoft.com/office/powerpoint/2010/main" val="155600189"/>
       </p:ext>
     </p:extLst>
   </p:cSld>
@@ -7281,7 +7404,7 @@
           <p:cNvPr id="2" name="Title 1">
             <a:extLst>
               <a:ext uri="{FF2B5EF4-FFF2-40B4-BE49-F238E27FC236}">
-                <a16:creationId xmlns:a16="http://schemas.microsoft.com/office/drawing/2014/main" id="{9E751FF2-53D6-4C09-9042-A52B4995B7B1}"/>
+                <a16:creationId xmlns:a16="http://schemas.microsoft.com/office/drawing/2014/main" id="{95D59949-280F-43AA-8DA0-8BCC418455C6}"/>
               </a:ext>
             </a:extLst>
           </p:cNvPr>
@@ -7294,22 +7417,28 @@
         </p:nvSpPr>
         <p:spPr/>
         <p:txBody>
-          <a:bodyPr/>
-          <a:lstStyle/>
-          <a:p>
-            <a:r>
-              <a:rPr lang="en-US" dirty="0"/>
-              <a:t>Comparing Overall Crime with Crime during full moon </a:t>
-            </a:r>
+          <a:bodyPr>
+            <a:normAutofit/>
+          </a:bodyPr>
+          <a:lstStyle/>
+          <a:p>
+            <a:r>
+              <a:rPr lang="en-US" sz="3200" b="0" i="0" dirty="0">
+                <a:effectLst/>
+                <a:latin typeface="Slack-Lato"/>
+              </a:rPr>
+              <a:t>Comparing high crime holidays and full moon</a:t>
+            </a:r>
+            <a:endParaRPr lang="en-US" sz="3200" dirty="0"/>
           </a:p>
         </p:txBody>
       </p:sp>
       <p:pic>
         <p:nvPicPr>
-          <p:cNvPr id="5" name="Content Placeholder 4">
+          <p:cNvPr id="6" name="Content Placeholder 5" descr="Graphical user interface, application&#10;&#10;Description automatically generated">
             <a:extLst>
               <a:ext uri="{FF2B5EF4-FFF2-40B4-BE49-F238E27FC236}">
-                <a16:creationId xmlns:a16="http://schemas.microsoft.com/office/drawing/2014/main" id="{69B57829-34C3-40FC-89BA-77F4E2B1FF57}"/>
+                <a16:creationId xmlns:a16="http://schemas.microsoft.com/office/drawing/2014/main" id="{AABB4EA8-5387-BD4B-A182-4E2E68A3E1C5}"/>
               </a:ext>
             </a:extLst>
           </p:cNvPr>
@@ -7328,53 +7457,20 @@
         </p:blipFill>
         <p:spPr>
           <a:xfrm>
-            <a:off x="6096000" y="1678400"/>
-            <a:ext cx="3719297" cy="2479531"/>
+            <a:off x="685801" y="2065867"/>
+            <a:ext cx="6484107" cy="3649662"/>
           </a:xfrm>
           <a:solidFill>
             <a:schemeClr val="tx1"/>
           </a:solidFill>
         </p:spPr>
       </p:pic>
-      <p:pic>
-        <p:nvPicPr>
-          <p:cNvPr id="7" name="Picture 6">
+      <p:sp>
+        <p:nvSpPr>
+          <p:cNvPr id="8" name="TextBox 7">
             <a:extLst>
               <a:ext uri="{FF2B5EF4-FFF2-40B4-BE49-F238E27FC236}">
-                <a16:creationId xmlns:a16="http://schemas.microsoft.com/office/drawing/2014/main" id="{47BF138F-31FC-4A84-9320-2C447762AA8E}"/>
-              </a:ext>
-            </a:extLst>
-          </p:cNvPr>
-          <p:cNvPicPr>
-            <a:picLocks noChangeAspect="1"/>
-          </p:cNvPicPr>
-          <p:nvPr/>
-        </p:nvPicPr>
-        <p:blipFill>
-          <a:blip r:embed="rId3"/>
-          <a:stretch>
-            <a:fillRect/>
-          </a:stretch>
-        </p:blipFill>
-        <p:spPr>
-          <a:xfrm>
-            <a:off x="6089004" y="4157931"/>
-            <a:ext cx="3726293" cy="2546527"/>
-          </a:xfrm>
-          <a:prstGeom prst="rect">
-            <a:avLst/>
-          </a:prstGeom>
-          <a:solidFill>
-            <a:schemeClr val="tx1"/>
-          </a:solidFill>
-        </p:spPr>
-      </p:pic>
-      <p:sp>
-        <p:nvSpPr>
-          <p:cNvPr id="10" name="TextBox 9">
-            <a:extLst>
-              <a:ext uri="{FF2B5EF4-FFF2-40B4-BE49-F238E27FC236}">
-                <a16:creationId xmlns:a16="http://schemas.microsoft.com/office/drawing/2014/main" id="{B3B36B7B-3D95-4230-BA46-A2DC12F7F06E}"/>
+                <a16:creationId xmlns:a16="http://schemas.microsoft.com/office/drawing/2014/main" id="{45272294-9412-DD43-B5DE-54CB66A9AE03}"/>
               </a:ext>
             </a:extLst>
           </p:cNvPr>
@@ -7383,8 +7479,8 @@
         </p:nvSpPr>
         <p:spPr>
           <a:xfrm>
-            <a:off x="567328" y="2235941"/>
-            <a:ext cx="4752211" cy="2585323"/>
+            <a:off x="7590972" y="2065867"/>
+            <a:ext cx="3352800" cy="3785652"/>
           </a:xfrm>
           <a:prstGeom prst="rect">
             <a:avLst/>
@@ -7402,8 +7498,16 @@
               <a:buChar char="•"/>
             </a:pPr>
             <a:r>
-              <a:rPr lang="en-US" dirty="0"/>
-              <a:t>When one compares the overall data for crime reports with just the crime reports for the full moon, we can see a clear see a similar mean in both crime reports</a:t>
+              <a:rPr lang="en-US" sz="2400" dirty="0"/>
+              <a:t>Crime reports decreased around Christmas (25</a:t>
+            </a:r>
+            <a:r>
+              <a:rPr lang="en-US" sz="2400" baseline="30000" dirty="0"/>
+              <a:t>th</a:t>
+            </a:r>
+            <a:r>
+              <a:rPr lang="en-US" sz="2400" dirty="0"/>
+              <a:t> December)</a:t>
             </a:r>
           </a:p>
           <a:p>
@@ -7412,8 +7516,26 @@
               <a:buChar char="•"/>
             </a:pPr>
             <a:r>
-              <a:rPr lang="en-US" dirty="0"/>
-              <a:t>There is also more variance in the Number of Crimes in Years than the Number of Crimes during Full Moon, but that is more than likely due to the higher number of data for Crimes during Years</a:t>
+              <a:rPr lang="en-US" sz="2400" dirty="0"/>
+              <a:t>Crime reporting rates were higher on the 1</a:t>
+            </a:r>
+            <a:r>
+              <a:rPr lang="en-US" sz="2400" baseline="30000" dirty="0"/>
+              <a:t>st</a:t>
+            </a:r>
+            <a:r>
+              <a:rPr lang="en-US" sz="2400" dirty="0"/>
+              <a:t> of the month</a:t>
+            </a:r>
+          </a:p>
+          <a:p>
+            <a:pPr marL="285750" indent="-285750">
+              <a:buFont typeface="Arial" panose="020B0604020202020204" pitchFamily="34" charset="0"/>
+              <a:buChar char="•"/>
+            </a:pPr>
+            <a:r>
+              <a:rPr lang="en-US" sz="2400" dirty="0"/>
+              <a:t>There was no relation between the full moon and crimes reported </a:t>
             </a:r>
           </a:p>
         </p:txBody>
@@ -7421,7 +7543,140 @@
     </p:spTree>
     <p:extLst>
       <p:ext uri="{BB962C8B-B14F-4D97-AF65-F5344CB8AC3E}">
-        <p14:creationId xmlns:p14="http://schemas.microsoft.com/office/powerpoint/2010/main" val="3611135013"/>
+        <p14:creationId xmlns:p14="http://schemas.microsoft.com/office/powerpoint/2010/main" val="3232841496"/>
+      </p:ext>
+    </p:extLst>
+  </p:cSld>
+  <p:clrMapOvr>
+    <a:masterClrMapping/>
+  </p:clrMapOvr>
+</p:sld>
+</file>
+
+<file path=ppt/slides/slide19.xml><?xml version="1.0" encoding="utf-8"?>
+<p:sld xmlns:a="http://schemas.openxmlformats.org/drawingml/2006/main" xmlns:r="http://schemas.openxmlformats.org/officeDocument/2006/relationships" xmlns:p="http://schemas.openxmlformats.org/presentationml/2006/main">
+  <p:cSld>
+    <p:spTree>
+      <p:nvGrpSpPr>
+        <p:cNvPr id="1" name=""/>
+        <p:cNvGrpSpPr/>
+        <p:nvPr/>
+      </p:nvGrpSpPr>
+      <p:grpSpPr>
+        <a:xfrm>
+          <a:off x="0" y="0"/>
+          <a:ext cx="0" cy="0"/>
+          <a:chOff x="0" y="0"/>
+          <a:chExt cx="0" cy="0"/>
+        </a:xfrm>
+      </p:grpSpPr>
+      <p:sp>
+        <p:nvSpPr>
+          <p:cNvPr id="2" name="Title 1">
+            <a:extLst>
+              <a:ext uri="{FF2B5EF4-FFF2-40B4-BE49-F238E27FC236}">
+                <a16:creationId xmlns:a16="http://schemas.microsoft.com/office/drawing/2014/main" id="{95D59949-280F-43AA-8DA0-8BCC418455C6}"/>
+              </a:ext>
+            </a:extLst>
+          </p:cNvPr>
+          <p:cNvSpPr>
+            <a:spLocks noGrp="1"/>
+          </p:cNvSpPr>
+          <p:nvPr>
+            <p:ph type="title"/>
+          </p:nvPr>
+        </p:nvSpPr>
+        <p:spPr/>
+        <p:txBody>
+          <a:bodyPr>
+            <a:normAutofit/>
+          </a:bodyPr>
+          <a:lstStyle/>
+          <a:p>
+            <a:r>
+              <a:rPr lang="en-US" sz="3200" b="0" i="0" dirty="0">
+                <a:effectLst/>
+                <a:latin typeface="Slack-Lato"/>
+              </a:rPr>
+              <a:t>Comparing high crime holidays and full moon</a:t>
+            </a:r>
+            <a:endParaRPr lang="en-US" sz="3200" dirty="0"/>
+          </a:p>
+        </p:txBody>
+      </p:sp>
+      <p:sp>
+        <p:nvSpPr>
+          <p:cNvPr id="4" name="Content Placeholder 3">
+            <a:extLst>
+              <a:ext uri="{FF2B5EF4-FFF2-40B4-BE49-F238E27FC236}">
+                <a16:creationId xmlns:a16="http://schemas.microsoft.com/office/drawing/2014/main" id="{237D400C-391F-1040-B25C-80BDF5942ED4}"/>
+              </a:ext>
+            </a:extLst>
+          </p:cNvPr>
+          <p:cNvSpPr>
+            <a:spLocks noGrp="1"/>
+          </p:cNvSpPr>
+          <p:nvPr>
+            <p:ph idx="1"/>
+          </p:nvPr>
+        </p:nvSpPr>
+        <p:spPr>
+          <a:xfrm>
+            <a:off x="685801" y="2142067"/>
+            <a:ext cx="10432142" cy="3649133"/>
+          </a:xfrm>
+        </p:spPr>
+        <p:txBody>
+          <a:bodyPr>
+            <a:normAutofit/>
+          </a:bodyPr>
+          <a:lstStyle/>
+          <a:p>
+            <a:r>
+              <a:rPr lang="en-US" sz="2400" b="1" dirty="0"/>
+              <a:t>There was no correlation between the full moon and crime reported</a:t>
+            </a:r>
+          </a:p>
+          <a:p>
+            <a:r>
+              <a:rPr lang="en-US" sz="2400" dirty="0"/>
+              <a:t>Crimes reported were highest for 1</a:t>
+            </a:r>
+            <a:r>
+              <a:rPr lang="en-US" sz="2400" baseline="30000" dirty="0"/>
+              <a:t>st</a:t>
+            </a:r>
+            <a:r>
+              <a:rPr lang="en-US" sz="2400" dirty="0"/>
+              <a:t> of January for all years chosen</a:t>
+            </a:r>
+          </a:p>
+          <a:p>
+            <a:r>
+              <a:rPr lang="en-US" sz="2400" dirty="0"/>
+              <a:t>There was an overall increase in the crime reports on the 1</a:t>
+            </a:r>
+            <a:r>
+              <a:rPr lang="en-US" sz="2400" baseline="30000" dirty="0"/>
+              <a:t>st</a:t>
+            </a:r>
+            <a:r>
+              <a:rPr lang="en-US" sz="2400" dirty="0"/>
+              <a:t> of the months chosen</a:t>
+            </a:r>
+          </a:p>
+          <a:p>
+            <a:r>
+              <a:rPr lang="en-US" sz="2400" dirty="0"/>
+              <a:t>Crime reports decreased during Christmas time</a:t>
+            </a:r>
+          </a:p>
+        </p:txBody>
+      </p:sp>
+    </p:spTree>
+    <p:extLst>
+      <p:ext uri="{BB962C8B-B14F-4D97-AF65-F5344CB8AC3E}">
+        <p14:creationId xmlns:p14="http://schemas.microsoft.com/office/powerpoint/2010/main" val="2492173261"/>
       </p:ext>
     </p:extLst>
   </p:cSld>
@@ -7620,6 +7875,178 @@
     <p:extLst>
       <p:ext uri="{BB962C8B-B14F-4D97-AF65-F5344CB8AC3E}">
         <p14:creationId xmlns:p14="http://schemas.microsoft.com/office/powerpoint/2010/main" val="2052288600"/>
+      </p:ext>
+    </p:extLst>
+  </p:cSld>
+  <p:clrMapOvr>
+    <a:masterClrMapping/>
+  </p:clrMapOvr>
+</p:sld>
+</file>
+
+<file path=ppt/slides/slide20.xml><?xml version="1.0" encoding="utf-8"?>
+<p:sld xmlns:a="http://schemas.openxmlformats.org/drawingml/2006/main" xmlns:r="http://schemas.openxmlformats.org/officeDocument/2006/relationships" xmlns:p="http://schemas.openxmlformats.org/presentationml/2006/main">
+  <p:cSld>
+    <p:spTree>
+      <p:nvGrpSpPr>
+        <p:cNvPr id="1" name=""/>
+        <p:cNvGrpSpPr/>
+        <p:nvPr/>
+      </p:nvGrpSpPr>
+      <p:grpSpPr>
+        <a:xfrm>
+          <a:off x="0" y="0"/>
+          <a:ext cx="0" cy="0"/>
+          <a:chOff x="0" y="0"/>
+          <a:chExt cx="0" cy="0"/>
+        </a:xfrm>
+      </p:grpSpPr>
+      <p:sp>
+        <p:nvSpPr>
+          <p:cNvPr id="2" name="Title 1">
+            <a:extLst>
+              <a:ext uri="{FF2B5EF4-FFF2-40B4-BE49-F238E27FC236}">
+                <a16:creationId xmlns:a16="http://schemas.microsoft.com/office/drawing/2014/main" id="{9E751FF2-53D6-4C09-9042-A52B4995B7B1}"/>
+              </a:ext>
+            </a:extLst>
+          </p:cNvPr>
+          <p:cNvSpPr>
+            <a:spLocks noGrp="1"/>
+          </p:cNvSpPr>
+          <p:nvPr>
+            <p:ph type="title"/>
+          </p:nvPr>
+        </p:nvSpPr>
+        <p:spPr/>
+        <p:txBody>
+          <a:bodyPr/>
+          <a:lstStyle/>
+          <a:p>
+            <a:r>
+              <a:rPr lang="en-US" dirty="0"/>
+              <a:t>Comparing Overall Crime with Crime during full moon </a:t>
+            </a:r>
+          </a:p>
+        </p:txBody>
+      </p:sp>
+      <p:pic>
+        <p:nvPicPr>
+          <p:cNvPr id="5" name="Content Placeholder 4">
+            <a:extLst>
+              <a:ext uri="{FF2B5EF4-FFF2-40B4-BE49-F238E27FC236}">
+                <a16:creationId xmlns:a16="http://schemas.microsoft.com/office/drawing/2014/main" id="{69B57829-34C3-40FC-89BA-77F4E2B1FF57}"/>
+              </a:ext>
+            </a:extLst>
+          </p:cNvPr>
+          <p:cNvPicPr>
+            <a:picLocks noGrp="1" noChangeAspect="1"/>
+          </p:cNvPicPr>
+          <p:nvPr>
+            <p:ph idx="1"/>
+          </p:nvPr>
+        </p:nvPicPr>
+        <p:blipFill>
+          <a:blip r:embed="rId2"/>
+          <a:stretch>
+            <a:fillRect/>
+          </a:stretch>
+        </p:blipFill>
+        <p:spPr>
+          <a:xfrm>
+            <a:off x="6096000" y="1678400"/>
+            <a:ext cx="3719297" cy="2479531"/>
+          </a:xfrm>
+          <a:solidFill>
+            <a:schemeClr val="tx1"/>
+          </a:solidFill>
+        </p:spPr>
+      </p:pic>
+      <p:pic>
+        <p:nvPicPr>
+          <p:cNvPr id="7" name="Picture 6">
+            <a:extLst>
+              <a:ext uri="{FF2B5EF4-FFF2-40B4-BE49-F238E27FC236}">
+                <a16:creationId xmlns:a16="http://schemas.microsoft.com/office/drawing/2014/main" id="{47BF138F-31FC-4A84-9320-2C447762AA8E}"/>
+              </a:ext>
+            </a:extLst>
+          </p:cNvPr>
+          <p:cNvPicPr>
+            <a:picLocks noChangeAspect="1"/>
+          </p:cNvPicPr>
+          <p:nvPr/>
+        </p:nvPicPr>
+        <p:blipFill>
+          <a:blip r:embed="rId3"/>
+          <a:stretch>
+            <a:fillRect/>
+          </a:stretch>
+        </p:blipFill>
+        <p:spPr>
+          <a:xfrm>
+            <a:off x="6089004" y="4157931"/>
+            <a:ext cx="3726293" cy="2546527"/>
+          </a:xfrm>
+          <a:prstGeom prst="rect">
+            <a:avLst/>
+          </a:prstGeom>
+          <a:solidFill>
+            <a:schemeClr val="tx1"/>
+          </a:solidFill>
+        </p:spPr>
+      </p:pic>
+      <p:sp>
+        <p:nvSpPr>
+          <p:cNvPr id="10" name="TextBox 9">
+            <a:extLst>
+              <a:ext uri="{FF2B5EF4-FFF2-40B4-BE49-F238E27FC236}">
+                <a16:creationId xmlns:a16="http://schemas.microsoft.com/office/drawing/2014/main" id="{B3B36B7B-3D95-4230-BA46-A2DC12F7F06E}"/>
+              </a:ext>
+            </a:extLst>
+          </p:cNvPr>
+          <p:cNvSpPr txBox="1"/>
+          <p:nvPr/>
+        </p:nvSpPr>
+        <p:spPr>
+          <a:xfrm>
+            <a:off x="567328" y="2235941"/>
+            <a:ext cx="4752211" cy="2585323"/>
+          </a:xfrm>
+          <a:prstGeom prst="rect">
+            <a:avLst/>
+          </a:prstGeom>
+          <a:noFill/>
+        </p:spPr>
+        <p:txBody>
+          <a:bodyPr wrap="square" rtlCol="0">
+            <a:spAutoFit/>
+          </a:bodyPr>
+          <a:lstStyle/>
+          <a:p>
+            <a:pPr marL="285750" indent="-285750">
+              <a:buFont typeface="Arial" panose="020B0604020202020204" pitchFamily="34" charset="0"/>
+              <a:buChar char="•"/>
+            </a:pPr>
+            <a:r>
+              <a:rPr lang="en-US" dirty="0"/>
+              <a:t>When one compares the overall data for crime reports with just the crime reports for the full moon, we can see a clear see a similar mean in both crime reports</a:t>
+            </a:r>
+          </a:p>
+          <a:p>
+            <a:pPr marL="285750" indent="-285750">
+              <a:buFont typeface="Arial" panose="020B0604020202020204" pitchFamily="34" charset="0"/>
+              <a:buChar char="•"/>
+            </a:pPr>
+            <a:r>
+              <a:rPr lang="en-US" dirty="0"/>
+              <a:t>There is also more variance in the Number of Crimes in Years than the Number of Crimes during Full Moon, but that is more than likely due to the higher number of data for Crimes during Years</a:t>
+            </a:r>
+          </a:p>
+        </p:txBody>
+      </p:sp>
+    </p:spTree>
+    <p:extLst>
+      <p:ext uri="{BB962C8B-B14F-4D97-AF65-F5344CB8AC3E}">
+        <p14:creationId xmlns:p14="http://schemas.microsoft.com/office/powerpoint/2010/main" val="3611135013"/>
       </p:ext>
     </p:extLst>
   </p:cSld>

</xml_diff>